<commit_message>
Presentation and code clean up
</commit_message>
<xml_diff>
--- a/DOCS/Balaji_Sukumaran_B00948977_Presentation.pptx
+++ b/DOCS/Balaji_Sukumaran_B00948977_Presentation.pptx
@@ -5,7 +5,7 @@
     <p:sldMasterId id="2147483720" r:id="rId1"/>
   </p:sldMasterIdLst>
   <p:notesMasterIdLst>
-    <p:notesMasterId r:id="rId17"/>
+    <p:notesMasterId r:id="rId16"/>
   </p:notesMasterIdLst>
   <p:sldIdLst>
     <p:sldId id="256" r:id="rId2"/>
@@ -20,9 +20,8 @@
     <p:sldId id="267" r:id="rId11"/>
     <p:sldId id="268" r:id="rId12"/>
     <p:sldId id="269" r:id="rId13"/>
-    <p:sldId id="270" r:id="rId14"/>
-    <p:sldId id="271" r:id="rId15"/>
-    <p:sldId id="272" r:id="rId16"/>
+    <p:sldId id="271" r:id="rId14"/>
+    <p:sldId id="272" r:id="rId15"/>
   </p:sldIdLst>
   <p:sldSz cx="12192000" cy="6858000"/>
   <p:notesSz cx="6858000" cy="9144000"/>
@@ -138,12 +137,14 @@
             <p14:sldId id="267"/>
             <p14:sldId id="268"/>
             <p14:sldId id="269"/>
-            <p14:sldId id="270"/>
             <p14:sldId id="271"/>
             <p14:sldId id="272"/>
           </p14:sldIdLst>
         </p14:section>
       </p14:sectionLst>
+    </p:ext>
+    <p:ext uri="{EFAFB233-063F-42B5-8137-9DF3F51BA10A}">
+      <p15:sldGuideLst xmlns:p15="http://schemas.microsoft.com/office/powerpoint/2012/main"/>
     </p:ext>
   </p:extLst>
 </p:presentation>
@@ -231,7 +232,7 @@
           <a:p>
             <a:fld id="{49F0A3D7-6074-4D0D-B676-4375C3B68808}" type="datetimeFigureOut">
               <a:rPr lang="en-CA" smtClean="0"/>
-              <a:t>2024-03-31</a:t>
+              <a:t>2024-04-01</a:t>
             </a:fld>
             <a:endParaRPr lang="en-CA"/>
           </a:p>
@@ -732,7 +733,7 @@
           <a:p>
             <a:fld id="{8C11BC4E-3908-471D-9C66-5A2C5F0F5854}" type="slidenum">
               <a:rPr lang="en-CA" smtClean="0"/>
-              <a:t>14</a:t>
+              <a:t>13</a:t>
             </a:fld>
             <a:endParaRPr lang="en-CA"/>
           </a:p>
@@ -816,7 +817,7 @@
           <a:p>
             <a:fld id="{8C11BC4E-3908-471D-9C66-5A2C5F0F5854}" type="slidenum">
               <a:rPr lang="en-CA" smtClean="0"/>
-              <a:t>15</a:t>
+              <a:t>14</a:t>
             </a:fld>
             <a:endParaRPr lang="en-CA"/>
           </a:p>
@@ -966,7 +967,7 @@
           <a:p>
             <a:fld id="{100D977E-F0FD-484B-BDBE-23D7222B7C32}" type="datetimeFigureOut">
               <a:rPr lang="en-CA" smtClean="0"/>
-              <a:t>2024-03-31</a:t>
+              <a:t>2024-04-01</a:t>
             </a:fld>
             <a:endParaRPr lang="en-CA"/>
           </a:p>
@@ -1136,7 +1137,7 @@
           <a:p>
             <a:fld id="{100D977E-F0FD-484B-BDBE-23D7222B7C32}" type="datetimeFigureOut">
               <a:rPr lang="en-CA" smtClean="0"/>
-              <a:t>2024-03-31</a:t>
+              <a:t>2024-04-01</a:t>
             </a:fld>
             <a:endParaRPr lang="en-CA"/>
           </a:p>
@@ -1316,7 +1317,7 @@
           <a:p>
             <a:fld id="{100D977E-F0FD-484B-BDBE-23D7222B7C32}" type="datetimeFigureOut">
               <a:rPr lang="en-CA" smtClean="0"/>
-              <a:t>2024-03-31</a:t>
+              <a:t>2024-04-01</a:t>
             </a:fld>
             <a:endParaRPr lang="en-CA"/>
           </a:p>
@@ -1486,7 +1487,7 @@
           <a:p>
             <a:fld id="{100D977E-F0FD-484B-BDBE-23D7222B7C32}" type="datetimeFigureOut">
               <a:rPr lang="en-CA" smtClean="0"/>
-              <a:t>2024-03-31</a:t>
+              <a:t>2024-04-01</a:t>
             </a:fld>
             <a:endParaRPr lang="en-CA"/>
           </a:p>
@@ -1732,7 +1733,7 @@
           <a:p>
             <a:fld id="{100D977E-F0FD-484B-BDBE-23D7222B7C32}" type="datetimeFigureOut">
               <a:rPr lang="en-CA" smtClean="0"/>
-              <a:t>2024-03-31</a:t>
+              <a:t>2024-04-01</a:t>
             </a:fld>
             <a:endParaRPr lang="en-CA"/>
           </a:p>
@@ -1964,7 +1965,7 @@
           <a:p>
             <a:fld id="{100D977E-F0FD-484B-BDBE-23D7222B7C32}" type="datetimeFigureOut">
               <a:rPr lang="en-CA" smtClean="0"/>
-              <a:t>2024-03-31</a:t>
+              <a:t>2024-04-01</a:t>
             </a:fld>
             <a:endParaRPr lang="en-CA"/>
           </a:p>
@@ -2331,7 +2332,7 @@
           <a:p>
             <a:fld id="{100D977E-F0FD-484B-BDBE-23D7222B7C32}" type="datetimeFigureOut">
               <a:rPr lang="en-CA" smtClean="0"/>
-              <a:t>2024-03-31</a:t>
+              <a:t>2024-04-01</a:t>
             </a:fld>
             <a:endParaRPr lang="en-CA"/>
           </a:p>
@@ -2449,7 +2450,7 @@
           <a:p>
             <a:fld id="{100D977E-F0FD-484B-BDBE-23D7222B7C32}" type="datetimeFigureOut">
               <a:rPr lang="en-CA" smtClean="0"/>
-              <a:t>2024-03-31</a:t>
+              <a:t>2024-04-01</a:t>
             </a:fld>
             <a:endParaRPr lang="en-CA"/>
           </a:p>
@@ -2544,7 +2545,7 @@
           <a:p>
             <a:fld id="{100D977E-F0FD-484B-BDBE-23D7222B7C32}" type="datetimeFigureOut">
               <a:rPr lang="en-CA" smtClean="0"/>
-              <a:t>2024-03-31</a:t>
+              <a:t>2024-04-01</a:t>
             </a:fld>
             <a:endParaRPr lang="en-CA"/>
           </a:p>
@@ -2821,7 +2822,7 @@
           <a:p>
             <a:fld id="{100D977E-F0FD-484B-BDBE-23D7222B7C32}" type="datetimeFigureOut">
               <a:rPr lang="en-CA" smtClean="0"/>
-              <a:t>2024-03-31</a:t>
+              <a:t>2024-04-01</a:t>
             </a:fld>
             <a:endParaRPr lang="en-CA"/>
           </a:p>
@@ -3078,7 +3079,7 @@
           <a:p>
             <a:fld id="{100D977E-F0FD-484B-BDBE-23D7222B7C32}" type="datetimeFigureOut">
               <a:rPr lang="en-CA" smtClean="0"/>
-              <a:t>2024-03-31</a:t>
+              <a:t>2024-04-01</a:t>
             </a:fld>
             <a:endParaRPr lang="en-CA"/>
           </a:p>
@@ -3291,7 +3292,7 @@
           <a:p>
             <a:fld id="{100D977E-F0FD-484B-BDBE-23D7222B7C32}" type="datetimeFigureOut">
               <a:rPr lang="en-CA" smtClean="0"/>
-              <a:t>2024-03-31</a:t>
+              <a:t>2024-04-01</a:t>
             </a:fld>
             <a:endParaRPr lang="en-CA"/>
           </a:p>
@@ -3965,12 +3966,42 @@
           <a:p>
             <a:r>
               <a:rPr lang="en-US" b="1" dirty="0"/>
-              <a:t>Results</a:t>
+              <a:t>Results - Performance</a:t>
             </a:r>
             <a:endParaRPr lang="en-CA" b="1" dirty="0"/>
           </a:p>
         </p:txBody>
       </p:sp>
+      <p:pic>
+        <p:nvPicPr>
+          <p:cNvPr id="3" name="Picture 2">
+            <a:extLst>
+              <a:ext uri="{FF2B5EF4-FFF2-40B4-BE49-F238E27FC236}">
+                <a16:creationId xmlns:a16="http://schemas.microsoft.com/office/drawing/2014/main" id="{15FD2913-9870-419C-AA29-E6AFD33E2E70}"/>
+              </a:ext>
+            </a:extLst>
+          </p:cNvPr>
+          <p:cNvPicPr>
+            <a:picLocks noChangeAspect="1"/>
+          </p:cNvPicPr>
+          <p:nvPr/>
+        </p:nvPicPr>
+        <p:blipFill>
+          <a:blip r:embed="rId2"/>
+          <a:stretch>
+            <a:fillRect/>
+          </a:stretch>
+        </p:blipFill>
+        <p:spPr>
+          <a:xfrm>
+            <a:off x="938965" y="1939539"/>
+            <a:ext cx="4778253" cy="3758454"/>
+          </a:xfrm>
+          <a:prstGeom prst="rect">
+            <a:avLst/>
+          </a:prstGeom>
+        </p:spPr>
+      </p:pic>
     </p:spTree>
     <p:extLst>
       <p:ext uri="{BB962C8B-B14F-4D97-AF65-F5344CB8AC3E}">
@@ -4024,12 +4055,42 @@
           <a:p>
             <a:r>
               <a:rPr lang="en-US" b="1" dirty="0"/>
-              <a:t>Results</a:t>
+              <a:t>Results – Sentiment Analysis report</a:t>
             </a:r>
             <a:endParaRPr lang="en-CA" b="1" dirty="0"/>
           </a:p>
         </p:txBody>
       </p:sp>
+      <p:pic>
+        <p:nvPicPr>
+          <p:cNvPr id="3" name="Picture 2">
+            <a:extLst>
+              <a:ext uri="{FF2B5EF4-FFF2-40B4-BE49-F238E27FC236}">
+                <a16:creationId xmlns:a16="http://schemas.microsoft.com/office/drawing/2014/main" id="{1D534068-638E-4463-A188-00DF795BA1F7}"/>
+              </a:ext>
+            </a:extLst>
+          </p:cNvPr>
+          <p:cNvPicPr>
+            <a:picLocks noChangeAspect="1"/>
+          </p:cNvPicPr>
+          <p:nvPr/>
+        </p:nvPicPr>
+        <p:blipFill>
+          <a:blip r:embed="rId2"/>
+          <a:stretch>
+            <a:fillRect/>
+          </a:stretch>
+        </p:blipFill>
+        <p:spPr>
+          <a:xfrm>
+            <a:off x="838200" y="2299316"/>
+            <a:ext cx="5303971" cy="2809592"/>
+          </a:xfrm>
+          <a:prstGeom prst="rect">
+            <a:avLst/>
+          </a:prstGeom>
+        </p:spPr>
+      </p:pic>
     </p:spTree>
     <p:extLst>
       <p:ext uri="{BB962C8B-B14F-4D97-AF65-F5344CB8AC3E}">
@@ -4062,65 +4123,6 @@
       </p:grpSpPr>
       <p:sp>
         <p:nvSpPr>
-          <p:cNvPr id="2" name="Title 1">
-            <a:extLst>
-              <a:ext uri="{FF2B5EF4-FFF2-40B4-BE49-F238E27FC236}">
-                <a16:creationId xmlns:a16="http://schemas.microsoft.com/office/drawing/2014/main" id="{C0900819-83B7-4AE7-A714-17344DBF0D12}"/>
-              </a:ext>
-            </a:extLst>
-          </p:cNvPr>
-          <p:cNvSpPr>
-            <a:spLocks noGrp="1"/>
-          </p:cNvSpPr>
-          <p:nvPr>
-            <p:ph type="title"/>
-          </p:nvPr>
-        </p:nvSpPr>
-        <p:spPr/>
-        <p:txBody>
-          <a:bodyPr/>
-          <a:lstStyle/>
-          <a:p>
-            <a:r>
-              <a:rPr lang="en-US" b="1" dirty="0"/>
-              <a:t>Results</a:t>
-            </a:r>
-            <a:endParaRPr lang="en-CA" b="1" dirty="0"/>
-          </a:p>
-        </p:txBody>
-      </p:sp>
-    </p:spTree>
-    <p:extLst>
-      <p:ext uri="{BB962C8B-B14F-4D97-AF65-F5344CB8AC3E}">
-        <p14:creationId xmlns:p14="http://schemas.microsoft.com/office/powerpoint/2010/main" val="1574393785"/>
-      </p:ext>
-    </p:extLst>
-  </p:cSld>
-  <p:clrMapOvr>
-    <a:masterClrMapping/>
-  </p:clrMapOvr>
-</p:sld>
-</file>
-
-<file path=ppt/slides/slide14.xml><?xml version="1.0" encoding="utf-8"?>
-<p:sld xmlns:a="http://schemas.openxmlformats.org/drawingml/2006/main" xmlns:r="http://schemas.openxmlformats.org/officeDocument/2006/relationships" xmlns:p="http://schemas.openxmlformats.org/presentationml/2006/main">
-  <p:cSld>
-    <p:spTree>
-      <p:nvGrpSpPr>
-        <p:cNvPr id="1" name=""/>
-        <p:cNvGrpSpPr/>
-        <p:nvPr/>
-      </p:nvGrpSpPr>
-      <p:grpSpPr>
-        <a:xfrm>
-          <a:off x="0" y="0"/>
-          <a:ext cx="0" cy="0"/>
-          <a:chOff x="0" y="0"/>
-          <a:chExt cx="0" cy="0"/>
-        </a:xfrm>
-      </p:grpSpPr>
-      <p:sp>
-        <p:nvSpPr>
           <p:cNvPr id="3" name="Text Placeholder 2">
             <a:extLst>
               <a:ext uri="{FF2B5EF4-FFF2-40B4-BE49-F238E27FC236}">
@@ -4384,7 +4386,7 @@
 </p:sld>
 </file>
 
-<file path=ppt/slides/slide15.xml><?xml version="1.0" encoding="utf-8"?>
+<file path=ppt/slides/slide14.xml><?xml version="1.0" encoding="utf-8"?>
 <p:sld xmlns:a="http://schemas.openxmlformats.org/drawingml/2006/main" xmlns:r="http://schemas.openxmlformats.org/officeDocument/2006/relationships" xmlns:p="http://schemas.openxmlformats.org/presentationml/2006/main">
   <p:cSld>
     <p:spTree>
@@ -5313,61 +5315,61 @@
         </p:nvSpPr>
         <p:spPr/>
         <p:txBody>
-          <a:bodyPr/>
-          <a:lstStyle/>
-          <a:p>
-            <a:r>
-              <a:rPr lang="en-US" dirty="0"/>
+          <a:bodyPr>
+            <a:normAutofit/>
+          </a:bodyPr>
+          <a:lstStyle/>
+          <a:p>
+            <a:r>
+              <a:rPr lang="en-US" sz="1500" dirty="0"/>
+              <a:t>English words (Positive, Negative, Stop words) [6]</a:t>
+            </a:r>
+          </a:p>
+          <a:p>
+            <a:r>
+              <a:rPr lang="en-US" sz="1500" dirty="0"/>
               <a:t>E-Books from Project Gutenberg</a:t>
             </a:r>
           </a:p>
           <a:p>
             <a:pPr lvl="1"/>
             <a:r>
-              <a:rPr lang="en-US" dirty="0" err="1"/>
+              <a:rPr lang="en-US" sz="1500" dirty="0" err="1"/>
               <a:t>Gutendex</a:t>
             </a:r>
             <a:r>
-              <a:rPr lang="en-US" dirty="0"/>
+              <a:rPr lang="en-US" sz="1500" dirty="0"/>
               <a:t> </a:t>
             </a:r>
             <a:r>
-              <a:rPr lang="en-US" dirty="0" err="1"/>
+              <a:rPr lang="en-US" sz="1500" dirty="0" err="1"/>
               <a:t>Api</a:t>
             </a:r>
             <a:r>
-              <a:rPr lang="en-US" dirty="0"/>
+              <a:rPr lang="en-US" sz="1500" dirty="0"/>
               <a:t> [5]</a:t>
             </a:r>
           </a:p>
           <a:p>
             <a:pPr lvl="1"/>
             <a:r>
-              <a:rPr lang="en-US" dirty="0"/>
-              <a:t>Scripts [6]</a:t>
+              <a:rPr lang="en-US" sz="1500" dirty="0"/>
+              <a:t>Scripts</a:t>
             </a:r>
           </a:p>
           <a:p>
             <a:pPr lvl="2"/>
             <a:r>
-              <a:rPr lang="en-US" dirty="0"/>
+              <a:rPr lang="en-US" sz="1500" dirty="0"/>
               <a:t>Download</a:t>
             </a:r>
           </a:p>
           <a:p>
             <a:pPr lvl="2"/>
             <a:r>
-              <a:rPr lang="en-US" dirty="0"/>
+              <a:rPr lang="en-US" sz="1500" dirty="0"/>
               <a:t>Clean and Setup</a:t>
             </a:r>
-          </a:p>
-          <a:p>
-            <a:pPr lvl="1"/>
-            <a:endParaRPr lang="en-US" dirty="0"/>
-          </a:p>
-          <a:p>
-            <a:pPr lvl="1"/>
-            <a:endParaRPr lang="en-CA" dirty="0"/>
           </a:p>
         </p:txBody>
       </p:sp>

</xml_diff>